<commit_message>
Presentation and Release Plan 1st Draft
</commit_message>
<xml_diff>
--- a/Gymhelper presentation.pptx
+++ b/Gymhelper presentation.pptx
@@ -3172,8 +3172,8 @@
         </p:nvSpPr>
         <p:spPr>
           <a:xfrm>
-            <a:off x="457200" y="2133600"/>
-            <a:ext cx="8229600" cy="3992563"/>
+            <a:off x="457200" y="1823300"/>
+            <a:ext cx="8229600" cy="3992700"/>
           </a:xfrm>
           <a:prstGeom prst="rect">
             <a:avLst/>
@@ -3229,12 +3229,12 @@
             </a:endParaRPr>
           </a:p>
           <a:p>
-            <a:pPr indent="0" lvl="0" marL="0" rtl="0">
+            <a:pPr indent="-381000" lvl="0" marL="457200" rtl="0">
               <a:lnSpc>
                 <a:spcPct val="115000"/>
               </a:lnSpc>
               <a:spcBef>
-                <a:spcPts val="500"/>
+                <a:spcPts val="0"/>
               </a:spcBef>
               <a:spcAft>
                 <a:spcPts val="0"/>
@@ -3242,23 +3242,111 @@
               <a:buClr>
                 <a:schemeClr val="dk1"/>
               </a:buClr>
-              <a:buSzPts val="1100"/>
-              <a:buFont typeface="Arial"/>
-              <a:buNone/>
-            </a:pPr>
-            <a:r>
-              <a:rPr lang="en-US" sz="2000">
+              <a:buSzPts val="2400"/>
+              <a:buAutoNum type="arabicPeriod"/>
+            </a:pPr>
+            <a:r>
+              <a:rPr lang="en-US" sz="2400">
                 <a:solidFill>
                   <a:schemeClr val="dk1"/>
                 </a:solidFill>
-                <a:latin typeface="Times New Roman"/>
-                <a:ea typeface="Times New Roman"/>
-                <a:cs typeface="Times New Roman"/>
-                <a:sym typeface="Times New Roman"/>
-              </a:rPr>
-              <a:t>The users will have an account so that they can log in.</a:t>
-            </a:r>
-            <a:endParaRPr sz="2000">
+              </a:rPr>
+              <a:t>As a user, I want to create an account so that I can use the app</a:t>
+            </a:r>
+            <a:endParaRPr sz="2400">
+              <a:solidFill>
+                <a:schemeClr val="dk1"/>
+              </a:solidFill>
+            </a:endParaRPr>
+          </a:p>
+          <a:p>
+            <a:pPr indent="-381000" lvl="0" marL="457200" rtl="0">
+              <a:lnSpc>
+                <a:spcPct val="115000"/>
+              </a:lnSpc>
+              <a:spcBef>
+                <a:spcPts val="0"/>
+              </a:spcBef>
+              <a:spcAft>
+                <a:spcPts val="0"/>
+              </a:spcAft>
+              <a:buClr>
+                <a:schemeClr val="dk1"/>
+              </a:buClr>
+              <a:buSzPts val="2400"/>
+              <a:buAutoNum type="arabicPeriod"/>
+            </a:pPr>
+            <a:r>
+              <a:rPr lang="en-US" sz="2400">
+                <a:solidFill>
+                  <a:schemeClr val="dk1"/>
+                </a:solidFill>
+              </a:rPr>
+              <a:t>As a developer, I want to set up authentication servers so our user’s information is secure</a:t>
+            </a:r>
+            <a:endParaRPr sz="2400">
+              <a:solidFill>
+                <a:schemeClr val="dk1"/>
+              </a:solidFill>
+            </a:endParaRPr>
+          </a:p>
+          <a:p>
+            <a:pPr indent="-381000" lvl="0" marL="457200" rtl="0">
+              <a:lnSpc>
+                <a:spcPct val="115000"/>
+              </a:lnSpc>
+              <a:spcBef>
+                <a:spcPts val="0"/>
+              </a:spcBef>
+              <a:spcAft>
+                <a:spcPts val="0"/>
+              </a:spcAft>
+              <a:buClr>
+                <a:schemeClr val="dk1"/>
+              </a:buClr>
+              <a:buSzPts val="2400"/>
+              <a:buAutoNum type="arabicPeriod"/>
+            </a:pPr>
+            <a:r>
+              <a:rPr lang="en-US" sz="2400">
+                <a:solidFill>
+                  <a:schemeClr val="dk1"/>
+                </a:solidFill>
+              </a:rPr>
+              <a:t>As a user I want to create a profile page so I can input personal health information for the app to use</a:t>
+            </a:r>
+            <a:endParaRPr sz="2400">
+              <a:solidFill>
+                <a:schemeClr val="dk1"/>
+              </a:solidFill>
+            </a:endParaRPr>
+          </a:p>
+          <a:p>
+            <a:pPr indent="-381000" lvl="0" marL="457200" rtl="0">
+              <a:lnSpc>
+                <a:spcPct val="115000"/>
+              </a:lnSpc>
+              <a:spcBef>
+                <a:spcPts val="0"/>
+              </a:spcBef>
+              <a:spcAft>
+                <a:spcPts val="0"/>
+              </a:spcAft>
+              <a:buClr>
+                <a:schemeClr val="dk1"/>
+              </a:buClr>
+              <a:buSzPts val="2400"/>
+              <a:buAutoNum type="arabicPeriod"/>
+            </a:pPr>
+            <a:r>
+              <a:rPr lang="en-US" sz="2400">
+                <a:solidFill>
+                  <a:schemeClr val="dk1"/>
+                </a:solidFill>
+              </a:rPr>
+              <a:t>As a user, I want a fitness journal page so I can keep track of my exercise data such as reps/sets</a:t>
+            </a:r>
+            <a:endParaRPr sz="2400">
               <a:solidFill>
                 <a:schemeClr val="dk1"/>
               </a:solidFill>
@@ -3267,75 +3355,6 @@
               <a:cs typeface="Times New Roman"/>
               <a:sym typeface="Times New Roman"/>
             </a:endParaRPr>
-          </a:p>
-          <a:p>
-            <a:pPr indent="0" lvl="0" marL="0" rtl="0">
-              <a:lnSpc>
-                <a:spcPct val="115000"/>
-              </a:lnSpc>
-              <a:spcBef>
-                <a:spcPts val="500"/>
-              </a:spcBef>
-              <a:spcAft>
-                <a:spcPts val="0"/>
-              </a:spcAft>
-              <a:buClr>
-                <a:schemeClr val="dk1"/>
-              </a:buClr>
-              <a:buSzPts val="1100"/>
-              <a:buFont typeface="Arial"/>
-              <a:buNone/>
-            </a:pPr>
-            <a:r>
-              <a:rPr lang="en-US" sz="2000">
-                <a:solidFill>
-                  <a:schemeClr val="dk1"/>
-                </a:solidFill>
-                <a:latin typeface="Times New Roman"/>
-                <a:ea typeface="Times New Roman"/>
-                <a:cs typeface="Times New Roman"/>
-                <a:sym typeface="Times New Roman"/>
-              </a:rPr>
-              <a:t>The users will have a profile so that they can be identified.</a:t>
-            </a:r>
-            <a:endParaRPr sz="2000">
-              <a:solidFill>
-                <a:schemeClr val="dk1"/>
-              </a:solidFill>
-              <a:latin typeface="Times New Roman"/>
-              <a:ea typeface="Times New Roman"/>
-              <a:cs typeface="Times New Roman"/>
-              <a:sym typeface="Times New Roman"/>
-            </a:endParaRPr>
-          </a:p>
-          <a:p>
-            <a:pPr indent="0" lvl="0" marL="0" rtl="0">
-              <a:lnSpc>
-                <a:spcPct val="115000"/>
-              </a:lnSpc>
-              <a:spcBef>
-                <a:spcPts val="500"/>
-              </a:spcBef>
-              <a:spcAft>
-                <a:spcPts val="0"/>
-              </a:spcAft>
-              <a:buSzPts val="1100"/>
-              <a:buFont typeface="Arial"/>
-              <a:buNone/>
-            </a:pPr>
-            <a:r>
-              <a:rPr lang="en-US" sz="2000">
-                <a:solidFill>
-                  <a:schemeClr val="dk1"/>
-                </a:solidFill>
-                <a:latin typeface="Times New Roman"/>
-                <a:ea typeface="Times New Roman"/>
-                <a:cs typeface="Times New Roman"/>
-                <a:sym typeface="Times New Roman"/>
-              </a:rPr>
-              <a:t>The users can enter the data so that the app has the data.</a:t>
-            </a:r>
-            <a:endParaRPr/>
           </a:p>
         </p:txBody>
       </p:sp>
@@ -3605,7 +3624,7 @@
               </a:rPr>
               <a:t>Sprint 2:</a:t>
             </a:r>
-            <a:endParaRPr sz="3200">
+            <a:endParaRPr sz="2400">
               <a:solidFill>
                 <a:schemeClr val="dk1"/>
               </a:solidFill>
@@ -3616,119 +3635,62 @@
             </a:endParaRPr>
           </a:p>
           <a:p>
-            <a:pPr indent="457200" lvl="0" marL="0" rtl="0">
+            <a:pPr indent="-381000" lvl="0" marL="457200" rtl="0">
               <a:lnSpc>
                 <a:spcPct val="115000"/>
               </a:lnSpc>
               <a:spcBef>
-                <a:spcPts val="800"/>
-              </a:spcBef>
-              <a:spcAft>
-                <a:spcPts val="0"/>
-              </a:spcAft>
-              <a:buSzPts val="1100"/>
-              <a:buFont typeface="Arial"/>
-              <a:buNone/>
-            </a:pPr>
-            <a:r>
-              <a:rPr lang="en-US" sz="2000">
+                <a:spcPts val="0"/>
+              </a:spcBef>
+              <a:spcAft>
+                <a:spcPts val="0"/>
+              </a:spcAft>
+              <a:buClr>
+                <a:schemeClr val="dk1"/>
+              </a:buClr>
+              <a:buSzPts val="2400"/>
+              <a:buAutoNum type="arabicPeriod"/>
+            </a:pPr>
+            <a:r>
+              <a:rPr lang="en-US" sz="2400">
                 <a:solidFill>
                   <a:schemeClr val="dk1"/>
                 </a:solidFill>
-                <a:latin typeface="Times New Roman"/>
-                <a:ea typeface="Times New Roman"/>
-                <a:cs typeface="Times New Roman"/>
-                <a:sym typeface="Times New Roman"/>
-              </a:rPr>
-              <a:t>The users can see a visualization of exercise that they did over a week or a month so that they know how much effort they put in work-out.</a:t>
-            </a:r>
-            <a:endParaRPr sz="2000">
+              </a:rPr>
+              <a:t>As a user I want data visualization so I can see my fitness progress over time</a:t>
+            </a:r>
+            <a:endParaRPr sz="2400">
               <a:solidFill>
                 <a:schemeClr val="dk1"/>
               </a:solidFill>
-              <a:latin typeface="Times New Roman"/>
-              <a:ea typeface="Times New Roman"/>
-              <a:cs typeface="Times New Roman"/>
-              <a:sym typeface="Times New Roman"/>
             </a:endParaRPr>
           </a:p>
           <a:p>
-            <a:pPr indent="457200" lvl="0" marL="0" rtl="0">
+            <a:pPr indent="-381000" lvl="0" marL="457200" rtl="0">
               <a:lnSpc>
                 <a:spcPct val="115000"/>
               </a:lnSpc>
               <a:spcBef>
-                <a:spcPts val="800"/>
-              </a:spcBef>
-              <a:spcAft>
-                <a:spcPts val="0"/>
-              </a:spcAft>
-              <a:buSzPts val="1100"/>
-              <a:buFont typeface="Arial"/>
-              <a:buNone/>
-            </a:pPr>
-            <a:r>
-              <a:rPr lang="en-US" sz="2000">
+                <a:spcPts val="0"/>
+              </a:spcBef>
+              <a:spcAft>
+                <a:spcPts val="0"/>
+              </a:spcAft>
+              <a:buClr>
+                <a:schemeClr val="dk1"/>
+              </a:buClr>
+              <a:buSzPts val="2400"/>
+              <a:buAutoNum type="arabicPeriod"/>
+            </a:pPr>
+            <a:r>
+              <a:rPr lang="en-US" sz="2400">
                 <a:solidFill>
                   <a:schemeClr val="dk1"/>
                 </a:solidFill>
-                <a:latin typeface="Times New Roman"/>
-                <a:ea typeface="Times New Roman"/>
-                <a:cs typeface="Times New Roman"/>
-                <a:sym typeface="Times New Roman"/>
-              </a:rPr>
-              <a:t>  The users can see a visualization of changes of their body (percentage of fat, muscle, water, etc) so that they will notice how much improvement they did.</a:t>
-            </a:r>
-            <a:endParaRPr sz="2000">
-              <a:solidFill>
-                <a:schemeClr val="dk1"/>
-              </a:solidFill>
-              <a:latin typeface="Times New Roman"/>
-              <a:ea typeface="Times New Roman"/>
-              <a:cs typeface="Times New Roman"/>
-              <a:sym typeface="Times New Roman"/>
-            </a:endParaRPr>
-          </a:p>
-          <a:p>
-            <a:pPr indent="457200" lvl="0" marL="0" rtl="0">
-              <a:lnSpc>
-                <a:spcPct val="115000"/>
-              </a:lnSpc>
-              <a:spcBef>
-                <a:spcPts val="800"/>
-              </a:spcBef>
-              <a:spcAft>
-                <a:spcPts val="0"/>
-              </a:spcAft>
-              <a:buSzPts val="1100"/>
-              <a:buFont typeface="Arial"/>
-              <a:buNone/>
-            </a:pPr>
-            <a:r>
-              <a:rPr lang="en-US" sz="2000">
-                <a:solidFill>
-                  <a:schemeClr val="dk1"/>
-                </a:solidFill>
-                <a:latin typeface="Times New Roman"/>
-                <a:ea typeface="Times New Roman"/>
-                <a:cs typeface="Times New Roman"/>
-                <a:sym typeface="Times New Roman"/>
-              </a:rPr>
-              <a:t>The users can find </a:t>
-            </a:r>
-            <a:r>
-              <a:rPr lang="en-US" sz="2000">
-                <a:solidFill>
-                  <a:schemeClr val="dk1"/>
-                </a:solidFill>
-                <a:latin typeface="Times New Roman"/>
-                <a:ea typeface="Times New Roman"/>
-                <a:cs typeface="Times New Roman"/>
-                <a:sym typeface="Times New Roman"/>
-              </a:rPr>
-              <a:t>achievement in their profile so that they feel proud by themselves for working out and they feel more encouraged to work out.</a:t>
-            </a:r>
-            <a:endParaRPr sz="2000">
+              </a:rPr>
+              <a:t>As a user I want an achievement system so I can celebrate milestones and personal goals I have achieved.</a:t>
+            </a:r>
+            <a:endParaRPr sz="2400">
               <a:solidFill>
                 <a:schemeClr val="dk1"/>
               </a:solidFill>
@@ -3963,8 +3925,8 @@
         </p:nvSpPr>
         <p:spPr>
           <a:xfrm>
-            <a:off x="457200" y="2133600"/>
-            <a:ext cx="8229600" cy="3992700"/>
+            <a:off x="457200" y="1761225"/>
+            <a:ext cx="8229600" cy="4869300"/>
           </a:xfrm>
           <a:prstGeom prst="rect">
             <a:avLst/>
@@ -4006,7 +3968,7 @@
               </a:rPr>
               <a:t>Sprint 3: </a:t>
             </a:r>
-            <a:endParaRPr sz="3200">
+            <a:endParaRPr sz="2400">
               <a:solidFill>
                 <a:schemeClr val="dk1"/>
               </a:solidFill>
@@ -4017,98 +3979,105 @@
             </a:endParaRPr>
           </a:p>
           <a:p>
-            <a:pPr indent="0" lvl="0" marL="0" rtl="0">
+            <a:pPr indent="-381000" lvl="0" marL="457200" rtl="0">
               <a:lnSpc>
                 <a:spcPct val="115000"/>
               </a:lnSpc>
               <a:spcBef>
-                <a:spcPts val="800"/>
-              </a:spcBef>
-              <a:spcAft>
-                <a:spcPts val="0"/>
-              </a:spcAft>
-              <a:buSzPts val="1100"/>
-              <a:buFont typeface="Arial"/>
-              <a:buNone/>
-            </a:pPr>
-            <a:r>
-              <a:rPr lang="en-US" sz="3200">
+                <a:spcPts val="0"/>
+              </a:spcBef>
+              <a:spcAft>
+                <a:spcPts val="0"/>
+              </a:spcAft>
+              <a:buClr>
+                <a:schemeClr val="dk1"/>
+              </a:buClr>
+              <a:buSzPts val="2400"/>
+              <a:buAutoNum type="arabicPeriod"/>
+            </a:pPr>
+            <a:r>
+              <a:rPr lang="en-US" sz="2400">
                 <a:solidFill>
                   <a:schemeClr val="dk1"/>
                 </a:solidFill>
-                <a:latin typeface="Times New Roman"/>
-                <a:ea typeface="Times New Roman"/>
-                <a:cs typeface="Times New Roman"/>
-                <a:sym typeface="Times New Roman"/>
-              </a:rPr>
-              <a:t>	</a:t>
-            </a:r>
-            <a:r>
-              <a:rPr lang="en-US" sz="2000">
+              </a:rPr>
+              <a:t>As a user I want the ability to contact individuals within the network so that I can connect with my friends. </a:t>
+            </a:r>
+            <a:endParaRPr sz="2400">
+              <a:solidFill>
+                <a:schemeClr val="dk1"/>
+              </a:solidFill>
+            </a:endParaRPr>
+          </a:p>
+          <a:p>
+            <a:pPr indent="-381000" lvl="0" marL="457200" rtl="0">
+              <a:lnSpc>
+                <a:spcPct val="115000"/>
+              </a:lnSpc>
+              <a:spcBef>
+                <a:spcPts val="0"/>
+              </a:spcBef>
+              <a:spcAft>
+                <a:spcPts val="0"/>
+              </a:spcAft>
+              <a:buClr>
+                <a:schemeClr val="dk1"/>
+              </a:buClr>
+              <a:buSzPts val="2400"/>
+              <a:buAutoNum type="arabicPeriod"/>
+            </a:pPr>
+            <a:r>
+              <a:rPr lang="en-US" sz="2400">
                 <a:solidFill>
                   <a:schemeClr val="dk1"/>
                 </a:solidFill>
-                <a:latin typeface="Times New Roman"/>
-                <a:ea typeface="Times New Roman"/>
-                <a:cs typeface="Times New Roman"/>
-                <a:sym typeface="Times New Roman"/>
-              </a:rPr>
-              <a:t>The app can suggest chat room for the users based on their profile </a:t>
-            </a:r>
-            <a:endParaRPr sz="2000">
+              </a:rPr>
+              <a:t>As a user, I want the ability to chat with groups of individuals within the Gym Helper app to discuss my fitness and goals.</a:t>
+            </a:r>
+            <a:endParaRPr sz="2400">
               <a:solidFill>
                 <a:schemeClr val="dk1"/>
               </a:solidFill>
-              <a:latin typeface="Times New Roman"/>
-              <a:ea typeface="Times New Roman"/>
-              <a:cs typeface="Times New Roman"/>
-              <a:sym typeface="Times New Roman"/>
             </a:endParaRPr>
           </a:p>
           <a:p>
-            <a:pPr indent="457200" lvl="0" marL="0" rtl="0">
+            <a:pPr indent="-381000" lvl="0" marL="457200" rtl="0">
               <a:lnSpc>
                 <a:spcPct val="115000"/>
               </a:lnSpc>
               <a:spcBef>
-                <a:spcPts val="500"/>
-              </a:spcBef>
-              <a:spcAft>
-                <a:spcPts val="0"/>
-              </a:spcAft>
-              <a:buSzPts val="1100"/>
-              <a:buFont typeface="Arial"/>
-              <a:buNone/>
-            </a:pPr>
-            <a:r>
-              <a:rPr lang="en-US" sz="2000">
+                <a:spcPts val="0"/>
+              </a:spcBef>
+              <a:spcAft>
+                <a:spcPts val="0"/>
+              </a:spcAft>
+              <a:buClr>
+                <a:schemeClr val="dk1"/>
+              </a:buClr>
+              <a:buSzPts val="2400"/>
+              <a:buAutoNum type="arabicPeriod"/>
+            </a:pPr>
+            <a:r>
+              <a:rPr lang="en-US" sz="2400">
                 <a:solidFill>
                   <a:schemeClr val="dk1"/>
                 </a:solidFill>
-                <a:latin typeface="Times New Roman"/>
-                <a:ea typeface="Times New Roman"/>
-                <a:cs typeface="Times New Roman"/>
-                <a:sym typeface="Times New Roman"/>
-              </a:rPr>
-              <a:t>The users can add friends and chat with friends so that they can make friends.</a:t>
-            </a:r>
-            <a:endParaRPr sz="2000">
+              </a:rPr>
+              <a:t>As a user I want to add other users as friends on the app so I can watch their progress towards their fitness goals.</a:t>
+            </a:r>
+            <a:endParaRPr sz="2400">
               <a:solidFill>
                 <a:schemeClr val="dk1"/>
               </a:solidFill>
-              <a:latin typeface="Times New Roman"/>
-              <a:ea typeface="Times New Roman"/>
-              <a:cs typeface="Times New Roman"/>
-              <a:sym typeface="Times New Roman"/>
             </a:endParaRPr>
           </a:p>
           <a:p>
-            <a:pPr indent="457200" lvl="0" marL="0" rtl="0">
+            <a:pPr indent="-381000" lvl="0" marL="457200" rtl="0">
               <a:lnSpc>
                 <a:spcPct val="115000"/>
               </a:lnSpc>
               <a:spcBef>
-                <a:spcPts val="500"/>
+                <a:spcPts val="0"/>
               </a:spcBef>
               <a:spcAft>
                 <a:spcPts val="0"/>
@@ -4116,21 +4085,21 @@
               <a:buClr>
                 <a:schemeClr val="dk1"/>
               </a:buClr>
-              <a:buSzPts val="1100"/>
-              <a:buFont typeface="Arial"/>
-              <a:buNone/>
-            </a:pPr>
-            <a:r>
-              <a:t/>
-            </a:r>
-            <a:endParaRPr sz="2000">
+              <a:buSzPts val="2400"/>
+              <a:buAutoNum type="arabicPeriod"/>
+            </a:pPr>
+            <a:r>
+              <a:rPr lang="en-US" sz="2400">
+                <a:solidFill>
+                  <a:schemeClr val="dk1"/>
+                </a:solidFill>
+              </a:rPr>
+              <a:t>As a user, I want a leaderboard system so that I can compare my accomplishments with other individuals in the system.</a:t>
+            </a:r>
+            <a:endParaRPr sz="2400">
               <a:solidFill>
                 <a:schemeClr val="dk1"/>
               </a:solidFill>
-              <a:latin typeface="Times New Roman"/>
-              <a:ea typeface="Times New Roman"/>
-              <a:cs typeface="Times New Roman"/>
-              <a:sym typeface="Times New Roman"/>
             </a:endParaRPr>
           </a:p>
         </p:txBody>
@@ -4421,7 +4390,7 @@
                 <a:cs typeface="Times New Roman"/>
                 <a:sym typeface="Times New Roman"/>
               </a:rPr>
-              <a:t>Profile, chatroom, friendlist </a:t>
+              <a:t>Profile, chat room, friend list </a:t>
             </a:r>
             <a:endParaRPr sz="2400">
               <a:latin typeface="Times New Roman"/>
@@ -4500,28 +4469,6 @@
                 <a:sym typeface="Times New Roman"/>
               </a:rPr>
               <a:t>	Data collection, </a:t>
-            </a:r>
-            <a:endParaRPr sz="3200">
-              <a:latin typeface="Times New Roman"/>
-              <a:ea typeface="Times New Roman"/>
-              <a:cs typeface="Times New Roman"/>
-              <a:sym typeface="Times New Roman"/>
-            </a:endParaRPr>
-          </a:p>
-          <a:p>
-            <a:pPr indent="0" lvl="0" marL="0" marR="0" rtl="0" algn="l">
-              <a:spcBef>
-                <a:spcPts val="0"/>
-              </a:spcBef>
-              <a:spcAft>
-                <a:spcPts val="0"/>
-              </a:spcAft>
-              <a:buSzPts val="3200"/>
-              <a:buFont typeface="Arial"/>
-              <a:buNone/>
-            </a:pPr>
-            <a:r>
-              <a:t/>
             </a:r>
             <a:endParaRPr sz="3200">
               <a:latin typeface="Times New Roman"/>

</xml_diff>